<commit_message>
End of Week 6
</commit_message>
<xml_diff>
--- a/courses/PH401/Computational/DesignPlanning.pptx
+++ b/courses/PH401/Computational/DesignPlanning.pptx
@@ -11702,7 +11702,7 @@
                 <p:ph sz="half" idx="2"/>
                 <p:extLst>
                   <p:ext uri="{D42A27DB-BD31-4B8C-83A1-F6EECF244321}">
-                    <p14:modId xmlns:p14="http://schemas.microsoft.com/office/powerpoint/2010/main" val="2373047480"/>
+                    <p14:modId xmlns:p14="http://schemas.microsoft.com/office/powerpoint/2010/main" val="578397029"/>
                   </p:ext>
                 </p:extLst>
               </p:nvPr>
@@ -11735,7 +11735,7 @@
                 <p:ph sz="half" idx="2"/>
                 <p:extLst>
                   <p:ext uri="{D42A27DB-BD31-4B8C-83A1-F6EECF244321}">
-                    <p14:modId xmlns:p14="http://schemas.microsoft.com/office/powerpoint/2010/main" val="2373047480"/>
+                    <p14:modId xmlns:p14="http://schemas.microsoft.com/office/powerpoint/2010/main" val="578397029"/>
                   </p:ext>
                 </p:extLst>
               </p:nvPr>

</xml_diff>